<commit_message>
corrected class diagram in ppp
</commit_message>
<xml_diff>
--- a/doc/task12/Task12.pptx
+++ b/doc/task12/Task12.pptx
@@ -7006,11 +7006,7 @@
           <a:p>
             <a:r>
               <a:rPr lang="de-DE" dirty="0" smtClean="0"/>
-              <a:t>CS1: Task </a:t>
-            </a:r>
-            <a:r>
-              <a:rPr lang="de-DE" dirty="0" smtClean="0"/>
-              <a:t>12</a:t>
+              <a:t>CS1: Task 12</a:t>
             </a:r>
             <a:endParaRPr lang="de-CH" dirty="0"/>
           </a:p>
@@ -7033,11 +7029,7 @@
           <a:p>
             <a:r>
               <a:rPr lang="de-CH" b="1" dirty="0" smtClean="0"/>
-              <a:t>17.12.15</a:t>
-            </a:r>
-            <a:r>
-              <a:rPr lang="de-CH" b="1" dirty="0" smtClean="0"/>
-              <a:t>, Gruppe Blau</a:t>
+              <a:t>17.12.15, Gruppe Blau</a:t>
             </a:r>
             <a:endParaRPr lang="de-DE" b="1" dirty="0"/>
           </a:p>
@@ -7220,7 +7212,7 @@
       </p:sp>
       <p:pic>
         <p:nvPicPr>
-          <p:cNvPr id="4" name="Picture 3"/>
+          <p:cNvPr id="2" name="Picture 1"/>
           <p:cNvPicPr>
             <a:picLocks noChangeAspect="1"/>
           </p:cNvPicPr>
@@ -8307,23 +8299,6 @@
 </file>
 
 <file path=customXml/item1.xml><?xml version="1.0" encoding="utf-8"?>
-<?mso-contentType ?>
-<FormTemplates xmlns="http://schemas.microsoft.com/sharepoint/v3/contenttype/forms">
-  <Display>DocumentLibraryForm</Display>
-  <Edit>DocumentLibraryForm</Edit>
-  <New>DocumentLibraryForm</New>
-</FormTemplates>
-</file>
-
-<file path=customXml/item2.xml><?xml version="1.0" encoding="utf-8"?>
-<p:properties xmlns:p="http://schemas.microsoft.com/office/2006/metadata/properties" xmlns:xsi="http://www.w3.org/2001/XMLSchema-instance">
-  <documentManagement>
-    <AVMTitle xmlns="5091c847-84be-4f4f-b16c-c018ad2ca66b">Präsentation BFH_2013</AVMTitle>
-  </documentManagement>
-</p:properties>
-</file>
-
-<file path=customXml/item3.xml><?xml version="1.0" encoding="utf-8"?>
 <ct:contentTypeSchema xmlns:ct="http://schemas.microsoft.com/office/2006/metadata/contentType" xmlns:ma="http://schemas.microsoft.com/office/2006/metadata/properties/metaAttributes" ct:_="" ma:_="" ma:contentTypeName="Dokument" ma:contentTypeID="0x010100EBE3A9EFF36793468C03E2811ACE2A2B" ma:contentTypeVersion="1" ma:contentTypeDescription="Ein neues Dokument erstellen." ma:contentTypeScope="" ma:versionID="e65be32cb1bfff77fc8c9c09bf542651">
   <xsd:schema xmlns:xsd="http://www.w3.org/2001/XMLSchema" xmlns:p="http://schemas.microsoft.com/office/2006/metadata/properties" xmlns:ns2="5091c847-84be-4f4f-b16c-c018ad2ca66b" targetNamespace="http://schemas.microsoft.com/office/2006/metadata/properties" ma:root="true" ma:fieldsID="7636c84aed5b7d09a166fcef888725d4" ns2:_="">
     <xsd:import namespace="5091c847-84be-4f4f-b16c-c018ad2ca66b"/>
@@ -8383,10 +8358,36 @@
 </ct:contentTypeSchema>
 </file>
 
+<file path=customXml/item2.xml><?xml version="1.0" encoding="utf-8"?>
+<p:properties xmlns:p="http://schemas.microsoft.com/office/2006/metadata/properties" xmlns:xsi="http://www.w3.org/2001/XMLSchema-instance">
+  <documentManagement>
+    <AVMTitle xmlns="5091c847-84be-4f4f-b16c-c018ad2ca66b">Präsentation BFH_2013</AVMTitle>
+  </documentManagement>
+</p:properties>
+</file>
+
+<file path=customXml/item3.xml><?xml version="1.0" encoding="utf-8"?>
+<?mso-contentType ?>
+<FormTemplates xmlns="http://schemas.microsoft.com/sharepoint/v3/contenttype/forms">
+  <Display>DocumentLibraryForm</Display>
+  <Edit>DocumentLibraryForm</Edit>
+  <New>DocumentLibraryForm</New>
+</FormTemplates>
+</file>
+
 <file path=customXml/itemProps1.xml><?xml version="1.0" encoding="utf-8"?>
-<ds:datastoreItem xmlns:ds="http://schemas.openxmlformats.org/officeDocument/2006/customXml" ds:itemID="{1851D33F-E468-417B-A30C-509B68D2BD09}">
+<ds:datastoreItem xmlns:ds="http://schemas.openxmlformats.org/officeDocument/2006/customXml" ds:itemID="{15287BEA-F3FF-4B87-929B-5D0092183197}">
   <ds:schemaRefs>
-    <ds:schemaRef ds:uri="http://schemas.microsoft.com/sharepoint/v3/contenttype/forms"/>
+    <ds:schemaRef ds:uri="http://schemas.microsoft.com/office/2006/metadata/contentType"/>
+    <ds:schemaRef ds:uri="http://schemas.microsoft.com/office/2006/metadata/properties/metaAttributes"/>
+    <ds:schemaRef ds:uri="http://www.w3.org/2001/XMLSchema"/>
+    <ds:schemaRef ds:uri="http://schemas.microsoft.com/office/2006/metadata/properties"/>
+    <ds:schemaRef ds:uri="5091c847-84be-4f4f-b16c-c018ad2ca66b"/>
+    <ds:schemaRef ds:uri="http://schemas.microsoft.com/office/2006/documentManagement/types"/>
+    <ds:schemaRef ds:uri="http://schemas.openxmlformats.org/package/2006/metadata/core-properties"/>
+    <ds:schemaRef ds:uri="http://purl.org/dc/elements/1.1/"/>
+    <ds:schemaRef ds:uri="http://purl.org/dc/terms/"/>
+    <ds:schemaRef ds:uri="http://schemas.microsoft.com/office/internal/2005/internalDocumentation"/>
   </ds:schemaRefs>
 </ds:datastoreItem>
 </file>
@@ -8407,18 +8408,9 @@
 </file>
 
 <file path=customXml/itemProps3.xml><?xml version="1.0" encoding="utf-8"?>
-<ds:datastoreItem xmlns:ds="http://schemas.openxmlformats.org/officeDocument/2006/customXml" ds:itemID="{15287BEA-F3FF-4B87-929B-5D0092183197}">
+<ds:datastoreItem xmlns:ds="http://schemas.openxmlformats.org/officeDocument/2006/customXml" ds:itemID="{1851D33F-E468-417B-A30C-509B68D2BD09}">
   <ds:schemaRefs>
-    <ds:schemaRef ds:uri="http://schemas.microsoft.com/office/2006/metadata/contentType"/>
-    <ds:schemaRef ds:uri="http://schemas.microsoft.com/office/2006/metadata/properties/metaAttributes"/>
-    <ds:schemaRef ds:uri="http://www.w3.org/2001/XMLSchema"/>
-    <ds:schemaRef ds:uri="http://schemas.microsoft.com/office/2006/metadata/properties"/>
-    <ds:schemaRef ds:uri="5091c847-84be-4f4f-b16c-c018ad2ca66b"/>
-    <ds:schemaRef ds:uri="http://schemas.microsoft.com/office/2006/documentManagement/types"/>
-    <ds:schemaRef ds:uri="http://schemas.openxmlformats.org/package/2006/metadata/core-properties"/>
-    <ds:schemaRef ds:uri="http://purl.org/dc/elements/1.1/"/>
-    <ds:schemaRef ds:uri="http://purl.org/dc/terms/"/>
-    <ds:schemaRef ds:uri="http://schemas.microsoft.com/office/internal/2005/internalDocumentation"/>
+    <ds:schemaRef ds:uri="http://schemas.microsoft.com/sharepoint/v3/contenttype/forms"/>
   </ds:schemaRefs>
 </ds:datastoreItem>
 </file>
</xml_diff>